<commit_message>
Fix presentation for lesson 3
</commit_message>
<xml_diff>
--- a/lessons/3/presentation.pptx
+++ b/lessons/3/presentation.pptx
@@ -73,7 +73,7 @@
         <p:spPr>
           <a:xfrm>
             <a:off x="504000" y="301320"/>
-            <a:ext cx="9071640" cy="1262160"/>
+            <a:ext cx="9071280" cy="1262160"/>
           </a:xfrm>
           <a:prstGeom prst="rect">
             <a:avLst/>
@@ -100,7 +100,7 @@
         <p:spPr>
           <a:xfrm>
             <a:off x="504000" y="1768680"/>
-            <a:ext cx="9072000" cy="2090880"/>
+            <a:ext cx="9071640" cy="2090880"/>
           </a:xfrm>
           <a:prstGeom prst="rect">
             <a:avLst/>
@@ -126,7 +126,7 @@
         <p:spPr>
           <a:xfrm>
             <a:off x="504000" y="4058640"/>
-            <a:ext cx="9072000" cy="2090880"/>
+            <a:ext cx="9071640" cy="2090880"/>
           </a:xfrm>
           <a:prstGeom prst="rect">
             <a:avLst/>
@@ -174,7 +174,7 @@
         <p:spPr>
           <a:xfrm>
             <a:off x="504000" y="301320"/>
-            <a:ext cx="9071640" cy="1262160"/>
+            <a:ext cx="9071280" cy="1262160"/>
           </a:xfrm>
           <a:prstGeom prst="rect">
             <a:avLst/>
@@ -327,7 +327,7 @@
         <p:spPr>
           <a:xfrm>
             <a:off x="504000" y="301320"/>
-            <a:ext cx="9071640" cy="1262160"/>
+            <a:ext cx="9071280" cy="1262160"/>
           </a:xfrm>
           <a:prstGeom prst="rect">
             <a:avLst/>
@@ -354,7 +354,7 @@
         <p:spPr>
           <a:xfrm>
             <a:off x="504000" y="1768680"/>
-            <a:ext cx="9072000" cy="4384080"/>
+            <a:ext cx="9071640" cy="4383720"/>
           </a:xfrm>
           <a:prstGeom prst="rect">
             <a:avLst/>
@@ -380,7 +380,7 @@
         <p:spPr>
           <a:xfrm>
             <a:off x="504000" y="1768680"/>
-            <a:ext cx="9072000" cy="4384080"/>
+            <a:ext cx="9071640" cy="4383720"/>
           </a:xfrm>
           <a:prstGeom prst="rect">
             <a:avLst/>
@@ -407,8 +407,8 @@
         </p:blipFill>
         <p:spPr>
           <a:xfrm>
-            <a:off x="2292480" y="1768680"/>
-            <a:ext cx="5494680" cy="4384080"/>
+            <a:off x="2292480" y="1768320"/>
+            <a:ext cx="5494320" cy="4383720"/>
           </a:xfrm>
           <a:prstGeom prst="rect">
             <a:avLst/>
@@ -432,8 +432,8 @@
         </p:blipFill>
         <p:spPr>
           <a:xfrm>
-            <a:off x="2292480" y="1768680"/>
-            <a:ext cx="5494680" cy="4384080"/>
+            <a:off x="2292480" y="1768320"/>
+            <a:ext cx="5494320" cy="4383720"/>
           </a:xfrm>
           <a:prstGeom prst="rect">
             <a:avLst/>
@@ -500,7 +500,7 @@
         <p:spPr>
           <a:xfrm>
             <a:off x="504000" y="301320"/>
-            <a:ext cx="9071640" cy="1262160"/>
+            <a:ext cx="9071280" cy="1262160"/>
           </a:xfrm>
           <a:prstGeom prst="rect">
             <a:avLst/>
@@ -527,7 +527,7 @@
         <p:spPr>
           <a:xfrm>
             <a:off x="504000" y="1768680"/>
-            <a:ext cx="9072000" cy="4384440"/>
+            <a:ext cx="9071640" cy="4384080"/>
           </a:xfrm>
           <a:prstGeom prst="rect">
             <a:avLst/>
@@ -576,7 +576,7 @@
         <p:spPr>
           <a:xfrm>
             <a:off x="504000" y="301320"/>
-            <a:ext cx="9071640" cy="1262160"/>
+            <a:ext cx="9071280" cy="1262160"/>
           </a:xfrm>
           <a:prstGeom prst="rect">
             <a:avLst/>
@@ -603,7 +603,7 @@
         <p:spPr>
           <a:xfrm>
             <a:off x="504000" y="1768680"/>
-            <a:ext cx="9072000" cy="4384080"/>
+            <a:ext cx="9071640" cy="4383720"/>
           </a:xfrm>
           <a:prstGeom prst="rect">
             <a:avLst/>
@@ -651,7 +651,7 @@
         <p:spPr>
           <a:xfrm>
             <a:off x="504000" y="301320"/>
-            <a:ext cx="9071640" cy="1262160"/>
+            <a:ext cx="9071280" cy="1262160"/>
           </a:xfrm>
           <a:prstGeom prst="rect">
             <a:avLst/>
@@ -678,7 +678,7 @@
         <p:spPr>
           <a:xfrm>
             <a:off x="504000" y="1768680"/>
-            <a:ext cx="4426920" cy="4384080"/>
+            <a:ext cx="4426920" cy="4383720"/>
           </a:xfrm>
           <a:prstGeom prst="rect">
             <a:avLst/>
@@ -704,7 +704,7 @@
         <p:spPr>
           <a:xfrm>
             <a:off x="5152680" y="1768680"/>
-            <a:ext cx="4426920" cy="4384080"/>
+            <a:ext cx="4426920" cy="4383720"/>
           </a:xfrm>
           <a:prstGeom prst="rect">
             <a:avLst/>
@@ -752,7 +752,7 @@
         <p:spPr>
           <a:xfrm>
             <a:off x="504000" y="301320"/>
-            <a:ext cx="9071640" cy="1262160"/>
+            <a:ext cx="9071280" cy="1262160"/>
           </a:xfrm>
           <a:prstGeom prst="rect">
             <a:avLst/>
@@ -801,7 +801,7 @@
         <p:spPr>
           <a:xfrm>
             <a:off x="504000" y="301320"/>
-            <a:ext cx="9071640" cy="5850720"/>
+            <a:ext cx="9071280" cy="5850720"/>
           </a:xfrm>
           <a:prstGeom prst="rect">
             <a:avLst/>
@@ -850,7 +850,7 @@
         <p:spPr>
           <a:xfrm>
             <a:off x="504000" y="301320"/>
-            <a:ext cx="9071640" cy="1262160"/>
+            <a:ext cx="9071280" cy="1262160"/>
           </a:xfrm>
           <a:prstGeom prst="rect">
             <a:avLst/>
@@ -929,7 +929,7 @@
         <p:spPr>
           <a:xfrm>
             <a:off x="5152680" y="1768680"/>
-            <a:ext cx="4426920" cy="4384080"/>
+            <a:ext cx="4426920" cy="4383720"/>
           </a:xfrm>
           <a:prstGeom prst="rect">
             <a:avLst/>
@@ -977,7 +977,7 @@
         <p:spPr>
           <a:xfrm>
             <a:off x="504000" y="301320"/>
-            <a:ext cx="9071640" cy="1262160"/>
+            <a:ext cx="9071280" cy="1262160"/>
           </a:xfrm>
           <a:prstGeom prst="rect">
             <a:avLst/>
@@ -1004,7 +1004,7 @@
         <p:spPr>
           <a:xfrm>
             <a:off x="504000" y="1768680"/>
-            <a:ext cx="9072000" cy="4384440"/>
+            <a:ext cx="9071640" cy="4384080"/>
           </a:xfrm>
           <a:prstGeom prst="rect">
             <a:avLst/>
@@ -1053,7 +1053,7 @@
         <p:spPr>
           <a:xfrm>
             <a:off x="504000" y="301320"/>
-            <a:ext cx="9071640" cy="1262160"/>
+            <a:ext cx="9071280" cy="1262160"/>
           </a:xfrm>
           <a:prstGeom prst="rect">
             <a:avLst/>
@@ -1080,7 +1080,7 @@
         <p:spPr>
           <a:xfrm>
             <a:off x="504000" y="1768680"/>
-            <a:ext cx="4426920" cy="4384080"/>
+            <a:ext cx="4426920" cy="4383720"/>
           </a:xfrm>
           <a:prstGeom prst="rect">
             <a:avLst/>
@@ -1180,7 +1180,7 @@
         <p:spPr>
           <a:xfrm>
             <a:off x="504000" y="301320"/>
-            <a:ext cx="9071640" cy="1262160"/>
+            <a:ext cx="9071280" cy="1262160"/>
           </a:xfrm>
           <a:prstGeom prst="rect">
             <a:avLst/>
@@ -1259,7 +1259,7 @@
         <p:spPr>
           <a:xfrm>
             <a:off x="504000" y="4058640"/>
-            <a:ext cx="9072000" cy="2090880"/>
+            <a:ext cx="9071640" cy="2090880"/>
           </a:xfrm>
           <a:prstGeom prst="rect">
             <a:avLst/>
@@ -1307,7 +1307,7 @@
         <p:spPr>
           <a:xfrm>
             <a:off x="504000" y="301320"/>
-            <a:ext cx="9071640" cy="1262160"/>
+            <a:ext cx="9071280" cy="1262160"/>
           </a:xfrm>
           <a:prstGeom prst="rect">
             <a:avLst/>
@@ -1334,7 +1334,7 @@
         <p:spPr>
           <a:xfrm>
             <a:off x="504000" y="1768680"/>
-            <a:ext cx="9072000" cy="2090880"/>
+            <a:ext cx="9071640" cy="2090880"/>
           </a:xfrm>
           <a:prstGeom prst="rect">
             <a:avLst/>
@@ -1360,7 +1360,7 @@
         <p:spPr>
           <a:xfrm>
             <a:off x="504000" y="4058640"/>
-            <a:ext cx="9072000" cy="2090880"/>
+            <a:ext cx="9071640" cy="2090880"/>
           </a:xfrm>
           <a:prstGeom prst="rect">
             <a:avLst/>
@@ -1408,7 +1408,7 @@
         <p:spPr>
           <a:xfrm>
             <a:off x="504000" y="301320"/>
-            <a:ext cx="9071640" cy="1262160"/>
+            <a:ext cx="9071280" cy="1262160"/>
           </a:xfrm>
           <a:prstGeom prst="rect">
             <a:avLst/>
@@ -1561,7 +1561,7 @@
         <p:spPr>
           <a:xfrm>
             <a:off x="504000" y="301320"/>
-            <a:ext cx="9071640" cy="1262160"/>
+            <a:ext cx="9071280" cy="1262160"/>
           </a:xfrm>
           <a:prstGeom prst="rect">
             <a:avLst/>
@@ -1588,7 +1588,7 @@
         <p:spPr>
           <a:xfrm>
             <a:off x="504000" y="1768680"/>
-            <a:ext cx="9072000" cy="4384080"/>
+            <a:ext cx="9071640" cy="4383720"/>
           </a:xfrm>
           <a:prstGeom prst="rect">
             <a:avLst/>
@@ -1614,7 +1614,7 @@
         <p:spPr>
           <a:xfrm>
             <a:off x="504000" y="1768680"/>
-            <a:ext cx="9072000" cy="4384080"/>
+            <a:ext cx="9071640" cy="4383720"/>
           </a:xfrm>
           <a:prstGeom prst="rect">
             <a:avLst/>
@@ -1641,8 +1641,8 @@
         </p:blipFill>
         <p:spPr>
           <a:xfrm>
-            <a:off x="2292480" y="1768680"/>
-            <a:ext cx="5494680" cy="4384080"/>
+            <a:off x="2292480" y="1768320"/>
+            <a:ext cx="5494320" cy="4383720"/>
           </a:xfrm>
           <a:prstGeom prst="rect">
             <a:avLst/>
@@ -1666,8 +1666,8 @@
         </p:blipFill>
         <p:spPr>
           <a:xfrm>
-            <a:off x="2292480" y="1768680"/>
-            <a:ext cx="5494680" cy="4384080"/>
+            <a:off x="2292480" y="1768320"/>
+            <a:ext cx="5494320" cy="4383720"/>
           </a:xfrm>
           <a:prstGeom prst="rect">
             <a:avLst/>
@@ -1734,7 +1734,7 @@
         <p:spPr>
           <a:xfrm>
             <a:off x="504000" y="301320"/>
-            <a:ext cx="9071640" cy="1262160"/>
+            <a:ext cx="9071280" cy="1262160"/>
           </a:xfrm>
           <a:prstGeom prst="rect">
             <a:avLst/>
@@ -1761,7 +1761,7 @@
         <p:spPr>
           <a:xfrm>
             <a:off x="504000" y="1768680"/>
-            <a:ext cx="9072000" cy="4384440"/>
+            <a:ext cx="9071640" cy="4384080"/>
           </a:xfrm>
           <a:prstGeom prst="rect">
             <a:avLst/>
@@ -1810,7 +1810,7 @@
         <p:spPr>
           <a:xfrm>
             <a:off x="504000" y="301320"/>
-            <a:ext cx="9071640" cy="1262160"/>
+            <a:ext cx="9071280" cy="1262160"/>
           </a:xfrm>
           <a:prstGeom prst="rect">
             <a:avLst/>
@@ -1837,7 +1837,7 @@
         <p:spPr>
           <a:xfrm>
             <a:off x="504000" y="1768680"/>
-            <a:ext cx="9072000" cy="4384080"/>
+            <a:ext cx="9071640" cy="4383720"/>
           </a:xfrm>
           <a:prstGeom prst="rect">
             <a:avLst/>
@@ -1885,7 +1885,7 @@
         <p:spPr>
           <a:xfrm>
             <a:off x="504000" y="301320"/>
-            <a:ext cx="9071640" cy="1262160"/>
+            <a:ext cx="9071280" cy="1262160"/>
           </a:xfrm>
           <a:prstGeom prst="rect">
             <a:avLst/>
@@ -1912,7 +1912,7 @@
         <p:spPr>
           <a:xfrm>
             <a:off x="504000" y="1768680"/>
-            <a:ext cx="4426920" cy="4384080"/>
+            <a:ext cx="4426920" cy="4383720"/>
           </a:xfrm>
           <a:prstGeom prst="rect">
             <a:avLst/>
@@ -1938,7 +1938,7 @@
         <p:spPr>
           <a:xfrm>
             <a:off x="5152680" y="1768680"/>
-            <a:ext cx="4426920" cy="4384080"/>
+            <a:ext cx="4426920" cy="4383720"/>
           </a:xfrm>
           <a:prstGeom prst="rect">
             <a:avLst/>
@@ -1986,7 +1986,7 @@
         <p:spPr>
           <a:xfrm>
             <a:off x="504000" y="301320"/>
-            <a:ext cx="9071640" cy="1262160"/>
+            <a:ext cx="9071280" cy="1262160"/>
           </a:xfrm>
           <a:prstGeom prst="rect">
             <a:avLst/>
@@ -2035,7 +2035,7 @@
         <p:spPr>
           <a:xfrm>
             <a:off x="504000" y="301320"/>
-            <a:ext cx="9071640" cy="1262160"/>
+            <a:ext cx="9071280" cy="1262160"/>
           </a:xfrm>
           <a:prstGeom prst="rect">
             <a:avLst/>
@@ -2062,7 +2062,7 @@
         <p:spPr>
           <a:xfrm>
             <a:off x="504000" y="1768680"/>
-            <a:ext cx="9072000" cy="4384080"/>
+            <a:ext cx="9071640" cy="4383720"/>
           </a:xfrm>
           <a:prstGeom prst="rect">
             <a:avLst/>
@@ -2110,7 +2110,7 @@
         <p:spPr>
           <a:xfrm>
             <a:off x="504000" y="301320"/>
-            <a:ext cx="9071640" cy="5850720"/>
+            <a:ext cx="9071280" cy="5850720"/>
           </a:xfrm>
           <a:prstGeom prst="rect">
             <a:avLst/>
@@ -2159,7 +2159,7 @@
         <p:spPr>
           <a:xfrm>
             <a:off x="504000" y="301320"/>
-            <a:ext cx="9071640" cy="1262160"/>
+            <a:ext cx="9071280" cy="1262160"/>
           </a:xfrm>
           <a:prstGeom prst="rect">
             <a:avLst/>
@@ -2238,7 +2238,7 @@
         <p:spPr>
           <a:xfrm>
             <a:off x="5152680" y="1768680"/>
-            <a:ext cx="4426920" cy="4384080"/>
+            <a:ext cx="4426920" cy="4383720"/>
           </a:xfrm>
           <a:prstGeom prst="rect">
             <a:avLst/>
@@ -2286,7 +2286,7 @@
         <p:spPr>
           <a:xfrm>
             <a:off x="504000" y="301320"/>
-            <a:ext cx="9071640" cy="1262160"/>
+            <a:ext cx="9071280" cy="1262160"/>
           </a:xfrm>
           <a:prstGeom prst="rect">
             <a:avLst/>
@@ -2313,7 +2313,7 @@
         <p:spPr>
           <a:xfrm>
             <a:off x="504000" y="1768680"/>
-            <a:ext cx="4426920" cy="4384080"/>
+            <a:ext cx="4426920" cy="4383720"/>
           </a:xfrm>
           <a:prstGeom prst="rect">
             <a:avLst/>
@@ -2413,7 +2413,7 @@
         <p:spPr>
           <a:xfrm>
             <a:off x="504000" y="301320"/>
-            <a:ext cx="9071640" cy="1262160"/>
+            <a:ext cx="9071280" cy="1262160"/>
           </a:xfrm>
           <a:prstGeom prst="rect">
             <a:avLst/>
@@ -2492,7 +2492,7 @@
         <p:spPr>
           <a:xfrm>
             <a:off x="504000" y="4058640"/>
-            <a:ext cx="9072000" cy="2090880"/>
+            <a:ext cx="9071640" cy="2090880"/>
           </a:xfrm>
           <a:prstGeom prst="rect">
             <a:avLst/>
@@ -2540,7 +2540,7 @@
         <p:spPr>
           <a:xfrm>
             <a:off x="504000" y="301320"/>
-            <a:ext cx="9071640" cy="1262160"/>
+            <a:ext cx="9071280" cy="1262160"/>
           </a:xfrm>
           <a:prstGeom prst="rect">
             <a:avLst/>
@@ -2567,7 +2567,7 @@
         <p:spPr>
           <a:xfrm>
             <a:off x="504000" y="1768680"/>
-            <a:ext cx="9072000" cy="2090880"/>
+            <a:ext cx="9071640" cy="2090880"/>
           </a:xfrm>
           <a:prstGeom prst="rect">
             <a:avLst/>
@@ -2593,7 +2593,7 @@
         <p:spPr>
           <a:xfrm>
             <a:off x="504000" y="4058640"/>
-            <a:ext cx="9072000" cy="2090880"/>
+            <a:ext cx="9071640" cy="2090880"/>
           </a:xfrm>
           <a:prstGeom prst="rect">
             <a:avLst/>
@@ -2641,7 +2641,7 @@
         <p:spPr>
           <a:xfrm>
             <a:off x="504000" y="301320"/>
-            <a:ext cx="9071640" cy="1262160"/>
+            <a:ext cx="9071280" cy="1262160"/>
           </a:xfrm>
           <a:prstGeom prst="rect">
             <a:avLst/>
@@ -2794,7 +2794,7 @@
         <p:spPr>
           <a:xfrm>
             <a:off x="504000" y="301320"/>
-            <a:ext cx="9071640" cy="1262160"/>
+            <a:ext cx="9071280" cy="1262160"/>
           </a:xfrm>
           <a:prstGeom prst="rect">
             <a:avLst/>
@@ -2821,7 +2821,7 @@
         <p:spPr>
           <a:xfrm>
             <a:off x="504000" y="1768680"/>
-            <a:ext cx="9072000" cy="4384080"/>
+            <a:ext cx="9071640" cy="4383720"/>
           </a:xfrm>
           <a:prstGeom prst="rect">
             <a:avLst/>
@@ -2847,7 +2847,7 @@
         <p:spPr>
           <a:xfrm>
             <a:off x="504000" y="1768680"/>
-            <a:ext cx="9072000" cy="4384080"/>
+            <a:ext cx="9071640" cy="4383720"/>
           </a:xfrm>
           <a:prstGeom prst="rect">
             <a:avLst/>
@@ -2874,8 +2874,8 @@
         </p:blipFill>
         <p:spPr>
           <a:xfrm>
-            <a:off x="2292480" y="1768680"/>
-            <a:ext cx="5494680" cy="4384080"/>
+            <a:off x="2292480" y="1768320"/>
+            <a:ext cx="5494320" cy="4383720"/>
           </a:xfrm>
           <a:prstGeom prst="rect">
             <a:avLst/>
@@ -2899,8 +2899,8 @@
         </p:blipFill>
         <p:spPr>
           <a:xfrm>
-            <a:off x="2292480" y="1768680"/>
-            <a:ext cx="5494680" cy="4384080"/>
+            <a:off x="2292480" y="1768320"/>
+            <a:ext cx="5494320" cy="4383720"/>
           </a:xfrm>
           <a:prstGeom prst="rect">
             <a:avLst/>
@@ -2967,7 +2967,7 @@
         <p:spPr>
           <a:xfrm>
             <a:off x="504000" y="301320"/>
-            <a:ext cx="9071640" cy="1262160"/>
+            <a:ext cx="9071280" cy="1262160"/>
           </a:xfrm>
           <a:prstGeom prst="rect">
             <a:avLst/>
@@ -2994,7 +2994,7 @@
         <p:spPr>
           <a:xfrm>
             <a:off x="504000" y="1768680"/>
-            <a:ext cx="9072000" cy="4384440"/>
+            <a:ext cx="9071640" cy="4384080"/>
           </a:xfrm>
           <a:prstGeom prst="rect">
             <a:avLst/>
@@ -3043,7 +3043,7 @@
         <p:spPr>
           <a:xfrm>
             <a:off x="504000" y="301320"/>
-            <a:ext cx="9071640" cy="1262160"/>
+            <a:ext cx="9071280" cy="1262160"/>
           </a:xfrm>
           <a:prstGeom prst="rect">
             <a:avLst/>
@@ -3070,7 +3070,7 @@
         <p:spPr>
           <a:xfrm>
             <a:off x="504000" y="1768680"/>
-            <a:ext cx="9072000" cy="4384080"/>
+            <a:ext cx="9071640" cy="4383720"/>
           </a:xfrm>
           <a:prstGeom prst="rect">
             <a:avLst/>
@@ -3118,7 +3118,7 @@
         <p:spPr>
           <a:xfrm>
             <a:off x="504000" y="301320"/>
-            <a:ext cx="9071640" cy="1262160"/>
+            <a:ext cx="9071280" cy="1262160"/>
           </a:xfrm>
           <a:prstGeom prst="rect">
             <a:avLst/>
@@ -3145,7 +3145,7 @@
         <p:spPr>
           <a:xfrm>
             <a:off x="504000" y="1768680"/>
-            <a:ext cx="4426920" cy="4384080"/>
+            <a:ext cx="4426920" cy="4383720"/>
           </a:xfrm>
           <a:prstGeom prst="rect">
             <a:avLst/>
@@ -3171,7 +3171,7 @@
         <p:spPr>
           <a:xfrm>
             <a:off x="5152680" y="1768680"/>
-            <a:ext cx="4426920" cy="4384080"/>
+            <a:ext cx="4426920" cy="4383720"/>
           </a:xfrm>
           <a:prstGeom prst="rect">
             <a:avLst/>
@@ -3219,7 +3219,7 @@
         <p:spPr>
           <a:xfrm>
             <a:off x="504000" y="301320"/>
-            <a:ext cx="9071640" cy="1262160"/>
+            <a:ext cx="9071280" cy="1262160"/>
           </a:xfrm>
           <a:prstGeom prst="rect">
             <a:avLst/>
@@ -3246,7 +3246,7 @@
         <p:spPr>
           <a:xfrm>
             <a:off x="504000" y="1768680"/>
-            <a:ext cx="4426920" cy="4384080"/>
+            <a:ext cx="4426920" cy="4383720"/>
           </a:xfrm>
           <a:prstGeom prst="rect">
             <a:avLst/>
@@ -3272,7 +3272,7 @@
         <p:spPr>
           <a:xfrm>
             <a:off x="5152680" y="1768680"/>
-            <a:ext cx="4426920" cy="4384080"/>
+            <a:ext cx="4426920" cy="4383720"/>
           </a:xfrm>
           <a:prstGeom prst="rect">
             <a:avLst/>
@@ -3320,7 +3320,7 @@
         <p:spPr>
           <a:xfrm>
             <a:off x="504000" y="301320"/>
-            <a:ext cx="9071640" cy="1262160"/>
+            <a:ext cx="9071280" cy="1262160"/>
           </a:xfrm>
           <a:prstGeom prst="rect">
             <a:avLst/>
@@ -3369,7 +3369,7 @@
         <p:spPr>
           <a:xfrm>
             <a:off x="504000" y="301320"/>
-            <a:ext cx="9071640" cy="5850720"/>
+            <a:ext cx="9071280" cy="5850720"/>
           </a:xfrm>
           <a:prstGeom prst="rect">
             <a:avLst/>
@@ -3418,7 +3418,7 @@
         <p:spPr>
           <a:xfrm>
             <a:off x="504000" y="301320"/>
-            <a:ext cx="9071640" cy="1262160"/>
+            <a:ext cx="9071280" cy="1262160"/>
           </a:xfrm>
           <a:prstGeom prst="rect">
             <a:avLst/>
@@ -3497,7 +3497,7 @@
         <p:spPr>
           <a:xfrm>
             <a:off x="5152680" y="1768680"/>
-            <a:ext cx="4426920" cy="4384080"/>
+            <a:ext cx="4426920" cy="4383720"/>
           </a:xfrm>
           <a:prstGeom prst="rect">
             <a:avLst/>
@@ -3545,7 +3545,7 @@
         <p:spPr>
           <a:xfrm>
             <a:off x="504000" y="301320"/>
-            <a:ext cx="9071640" cy="1262160"/>
+            <a:ext cx="9071280" cy="1262160"/>
           </a:xfrm>
           <a:prstGeom prst="rect">
             <a:avLst/>
@@ -3572,7 +3572,7 @@
         <p:spPr>
           <a:xfrm>
             <a:off x="504000" y="1768680"/>
-            <a:ext cx="4426920" cy="4384080"/>
+            <a:ext cx="4426920" cy="4383720"/>
           </a:xfrm>
           <a:prstGeom prst="rect">
             <a:avLst/>
@@ -3672,7 +3672,7 @@
         <p:spPr>
           <a:xfrm>
             <a:off x="504000" y="301320"/>
-            <a:ext cx="9071640" cy="1262160"/>
+            <a:ext cx="9071280" cy="1262160"/>
           </a:xfrm>
           <a:prstGeom prst="rect">
             <a:avLst/>
@@ -3751,7 +3751,7 @@
         <p:spPr>
           <a:xfrm>
             <a:off x="504000" y="4058640"/>
-            <a:ext cx="9072000" cy="2090880"/>
+            <a:ext cx="9071640" cy="2090880"/>
           </a:xfrm>
           <a:prstGeom prst="rect">
             <a:avLst/>
@@ -3799,7 +3799,7 @@
         <p:spPr>
           <a:xfrm>
             <a:off x="504000" y="301320"/>
-            <a:ext cx="9071640" cy="1262160"/>
+            <a:ext cx="9071280" cy="1262160"/>
           </a:xfrm>
           <a:prstGeom prst="rect">
             <a:avLst/>
@@ -3826,7 +3826,7 @@
         <p:spPr>
           <a:xfrm>
             <a:off x="504000" y="1768680"/>
-            <a:ext cx="9072000" cy="2090880"/>
+            <a:ext cx="9071640" cy="2090880"/>
           </a:xfrm>
           <a:prstGeom prst="rect">
             <a:avLst/>
@@ -3852,7 +3852,7 @@
         <p:spPr>
           <a:xfrm>
             <a:off x="504000" y="4058640"/>
-            <a:ext cx="9072000" cy="2090880"/>
+            <a:ext cx="9071640" cy="2090880"/>
           </a:xfrm>
           <a:prstGeom prst="rect">
             <a:avLst/>
@@ -3900,7 +3900,7 @@
         <p:spPr>
           <a:xfrm>
             <a:off x="504000" y="301320"/>
-            <a:ext cx="9071640" cy="1262160"/>
+            <a:ext cx="9071280" cy="1262160"/>
           </a:xfrm>
           <a:prstGeom prst="rect">
             <a:avLst/>
@@ -4053,7 +4053,7 @@
         <p:spPr>
           <a:xfrm>
             <a:off x="504000" y="301320"/>
-            <a:ext cx="9071640" cy="1262160"/>
+            <a:ext cx="9071280" cy="1262160"/>
           </a:xfrm>
           <a:prstGeom prst="rect">
             <a:avLst/>
@@ -4080,7 +4080,7 @@
         <p:spPr>
           <a:xfrm>
             <a:off x="504000" y="1768680"/>
-            <a:ext cx="9072000" cy="4384080"/>
+            <a:ext cx="9071640" cy="4383720"/>
           </a:xfrm>
           <a:prstGeom prst="rect">
             <a:avLst/>
@@ -4106,7 +4106,7 @@
         <p:spPr>
           <a:xfrm>
             <a:off x="504000" y="1768680"/>
-            <a:ext cx="9072000" cy="4384080"/>
+            <a:ext cx="9071640" cy="4383720"/>
           </a:xfrm>
           <a:prstGeom prst="rect">
             <a:avLst/>
@@ -4133,8 +4133,8 @@
         </p:blipFill>
         <p:spPr>
           <a:xfrm>
-            <a:off x="2292480" y="1768680"/>
-            <a:ext cx="5494680" cy="4384080"/>
+            <a:off x="2292480" y="1768320"/>
+            <a:ext cx="5494320" cy="4383720"/>
           </a:xfrm>
           <a:prstGeom prst="rect">
             <a:avLst/>
@@ -4158,8 +4158,8 @@
         </p:blipFill>
         <p:spPr>
           <a:xfrm>
-            <a:off x="2292480" y="1768680"/>
-            <a:ext cx="5494680" cy="4384080"/>
+            <a:off x="2292480" y="1768320"/>
+            <a:ext cx="5494320" cy="4383720"/>
           </a:xfrm>
           <a:prstGeom prst="rect">
             <a:avLst/>
@@ -4226,7 +4226,7 @@
         <p:spPr>
           <a:xfrm>
             <a:off x="504000" y="301320"/>
-            <a:ext cx="9071640" cy="1262160"/>
+            <a:ext cx="9071280" cy="1262160"/>
           </a:xfrm>
           <a:prstGeom prst="rect">
             <a:avLst/>
@@ -4275,7 +4275,7 @@
         <p:spPr>
           <a:xfrm>
             <a:off x="504000" y="301320"/>
-            <a:ext cx="9071640" cy="1262160"/>
+            <a:ext cx="9071280" cy="1262160"/>
           </a:xfrm>
           <a:prstGeom prst="rect">
             <a:avLst/>
@@ -4302,7 +4302,7 @@
         <p:spPr>
           <a:xfrm>
             <a:off x="504000" y="1768680"/>
-            <a:ext cx="9072000" cy="4384440"/>
+            <a:ext cx="9071640" cy="4384080"/>
           </a:xfrm>
           <a:prstGeom prst="rect">
             <a:avLst/>
@@ -4351,7 +4351,7 @@
         <p:spPr>
           <a:xfrm>
             <a:off x="504000" y="301320"/>
-            <a:ext cx="9071640" cy="1262160"/>
+            <a:ext cx="9071280" cy="1262160"/>
           </a:xfrm>
           <a:prstGeom prst="rect">
             <a:avLst/>
@@ -4378,7 +4378,7 @@
         <p:spPr>
           <a:xfrm>
             <a:off x="504000" y="1768680"/>
-            <a:ext cx="9072000" cy="4384080"/>
+            <a:ext cx="9071640" cy="4383720"/>
           </a:xfrm>
           <a:prstGeom prst="rect">
             <a:avLst/>
@@ -4426,7 +4426,7 @@
         <p:spPr>
           <a:xfrm>
             <a:off x="504000" y="301320"/>
-            <a:ext cx="9071640" cy="1262160"/>
+            <a:ext cx="9071280" cy="1262160"/>
           </a:xfrm>
           <a:prstGeom prst="rect">
             <a:avLst/>
@@ -4453,7 +4453,7 @@
         <p:spPr>
           <a:xfrm>
             <a:off x="504000" y="1768680"/>
-            <a:ext cx="4426920" cy="4384080"/>
+            <a:ext cx="4426920" cy="4383720"/>
           </a:xfrm>
           <a:prstGeom prst="rect">
             <a:avLst/>
@@ -4479,7 +4479,7 @@
         <p:spPr>
           <a:xfrm>
             <a:off x="5152680" y="1768680"/>
-            <a:ext cx="4426920" cy="4384080"/>
+            <a:ext cx="4426920" cy="4383720"/>
           </a:xfrm>
           <a:prstGeom prst="rect">
             <a:avLst/>
@@ -4527,7 +4527,7 @@
         <p:spPr>
           <a:xfrm>
             <a:off x="504000" y="301320"/>
-            <a:ext cx="9071640" cy="1262160"/>
+            <a:ext cx="9071280" cy="1262160"/>
           </a:xfrm>
           <a:prstGeom prst="rect">
             <a:avLst/>
@@ -4576,7 +4576,7 @@
         <p:spPr>
           <a:xfrm>
             <a:off x="504000" y="301320"/>
-            <a:ext cx="9071640" cy="5850720"/>
+            <a:ext cx="9071280" cy="5850720"/>
           </a:xfrm>
           <a:prstGeom prst="rect">
             <a:avLst/>
@@ -4625,7 +4625,7 @@
         <p:spPr>
           <a:xfrm>
             <a:off x="504000" y="301320"/>
-            <a:ext cx="9071640" cy="1262160"/>
+            <a:ext cx="9071280" cy="1262160"/>
           </a:xfrm>
           <a:prstGeom prst="rect">
             <a:avLst/>
@@ -4704,7 +4704,7 @@
         <p:spPr>
           <a:xfrm>
             <a:off x="5152680" y="1768680"/>
-            <a:ext cx="4426920" cy="4384080"/>
+            <a:ext cx="4426920" cy="4383720"/>
           </a:xfrm>
           <a:prstGeom prst="rect">
             <a:avLst/>
@@ -4752,7 +4752,7 @@
         <p:spPr>
           <a:xfrm>
             <a:off x="504000" y="301320"/>
-            <a:ext cx="9071640" cy="1262160"/>
+            <a:ext cx="9071280" cy="1262160"/>
           </a:xfrm>
           <a:prstGeom prst="rect">
             <a:avLst/>
@@ -4779,7 +4779,7 @@
         <p:spPr>
           <a:xfrm>
             <a:off x="504000" y="1768680"/>
-            <a:ext cx="4426920" cy="4384080"/>
+            <a:ext cx="4426920" cy="4383720"/>
           </a:xfrm>
           <a:prstGeom prst="rect">
             <a:avLst/>
@@ -4879,7 +4879,7 @@
         <p:spPr>
           <a:xfrm>
             <a:off x="504000" y="301320"/>
-            <a:ext cx="9071640" cy="1262160"/>
+            <a:ext cx="9071280" cy="1262160"/>
           </a:xfrm>
           <a:prstGeom prst="rect">
             <a:avLst/>
@@ -4958,7 +4958,7 @@
         <p:spPr>
           <a:xfrm>
             <a:off x="504000" y="4058640"/>
-            <a:ext cx="9072000" cy="2090880"/>
+            <a:ext cx="9071640" cy="2090880"/>
           </a:xfrm>
           <a:prstGeom prst="rect">
             <a:avLst/>
@@ -5006,7 +5006,7 @@
         <p:spPr>
           <a:xfrm>
             <a:off x="504000" y="301320"/>
-            <a:ext cx="9071640" cy="1262160"/>
+            <a:ext cx="9071280" cy="1262160"/>
           </a:xfrm>
           <a:prstGeom prst="rect">
             <a:avLst/>
@@ -5033,7 +5033,7 @@
         <p:spPr>
           <a:xfrm>
             <a:off x="504000" y="1768680"/>
-            <a:ext cx="9072000" cy="2090880"/>
+            <a:ext cx="9071640" cy="2090880"/>
           </a:xfrm>
           <a:prstGeom prst="rect">
             <a:avLst/>
@@ -5059,7 +5059,7 @@
         <p:spPr>
           <a:xfrm>
             <a:off x="504000" y="4058640"/>
-            <a:ext cx="9072000" cy="2090880"/>
+            <a:ext cx="9071640" cy="2090880"/>
           </a:xfrm>
           <a:prstGeom prst="rect">
             <a:avLst/>
@@ -5107,7 +5107,7 @@
         <p:spPr>
           <a:xfrm>
             <a:off x="504000" y="301320"/>
-            <a:ext cx="9071640" cy="1262160"/>
+            <a:ext cx="9071280" cy="1262160"/>
           </a:xfrm>
           <a:prstGeom prst="rect">
             <a:avLst/>
@@ -5260,7 +5260,7 @@
         <p:spPr>
           <a:xfrm>
             <a:off x="504000" y="301320"/>
-            <a:ext cx="9071640" cy="5850720"/>
+            <a:ext cx="9071280" cy="5850720"/>
           </a:xfrm>
           <a:prstGeom prst="rect">
             <a:avLst/>
@@ -5309,7 +5309,7 @@
         <p:spPr>
           <a:xfrm>
             <a:off x="504000" y="301320"/>
-            <a:ext cx="9071640" cy="1262160"/>
+            <a:ext cx="9071280" cy="1262160"/>
           </a:xfrm>
           <a:prstGeom prst="rect">
             <a:avLst/>
@@ -5336,7 +5336,7 @@
         <p:spPr>
           <a:xfrm>
             <a:off x="504000" y="1768680"/>
-            <a:ext cx="9072000" cy="4384080"/>
+            <a:ext cx="9071640" cy="4383720"/>
           </a:xfrm>
           <a:prstGeom prst="rect">
             <a:avLst/>
@@ -5362,7 +5362,7 @@
         <p:spPr>
           <a:xfrm>
             <a:off x="504000" y="1768680"/>
-            <a:ext cx="9072000" cy="4384080"/>
+            <a:ext cx="9071640" cy="4383720"/>
           </a:xfrm>
           <a:prstGeom prst="rect">
             <a:avLst/>
@@ -5389,8 +5389,8 @@
         </p:blipFill>
         <p:spPr>
           <a:xfrm>
-            <a:off x="2292480" y="1768680"/>
-            <a:ext cx="5494680" cy="4384080"/>
+            <a:off x="2292480" y="1768320"/>
+            <a:ext cx="5494320" cy="4383720"/>
           </a:xfrm>
           <a:prstGeom prst="rect">
             <a:avLst/>
@@ -5414,8 +5414,8 @@
         </p:blipFill>
         <p:spPr>
           <a:xfrm>
-            <a:off x="2292480" y="1768680"/>
-            <a:ext cx="5494680" cy="4384080"/>
+            <a:off x="2292480" y="1768320"/>
+            <a:ext cx="5494320" cy="4383720"/>
           </a:xfrm>
           <a:prstGeom prst="rect">
             <a:avLst/>
@@ -5460,7 +5460,7 @@
         <p:spPr>
           <a:xfrm>
             <a:off x="504000" y="301320"/>
-            <a:ext cx="9071640" cy="1262160"/>
+            <a:ext cx="9071280" cy="1262160"/>
           </a:xfrm>
           <a:prstGeom prst="rect">
             <a:avLst/>
@@ -5539,7 +5539,7 @@
         <p:spPr>
           <a:xfrm>
             <a:off x="5152680" y="1768680"/>
-            <a:ext cx="4426920" cy="4384080"/>
+            <a:ext cx="4426920" cy="4383720"/>
           </a:xfrm>
           <a:prstGeom prst="rect">
             <a:avLst/>
@@ -5587,7 +5587,7 @@
         <p:spPr>
           <a:xfrm>
             <a:off x="504000" y="301320"/>
-            <a:ext cx="9071640" cy="1262160"/>
+            <a:ext cx="9071280" cy="1262160"/>
           </a:xfrm>
           <a:prstGeom prst="rect">
             <a:avLst/>
@@ -5614,7 +5614,7 @@
         <p:spPr>
           <a:xfrm>
             <a:off x="504000" y="1768680"/>
-            <a:ext cx="4426920" cy="4384080"/>
+            <a:ext cx="4426920" cy="4383720"/>
           </a:xfrm>
           <a:prstGeom prst="rect">
             <a:avLst/>
@@ -5714,7 +5714,7 @@
         <p:spPr>
           <a:xfrm>
             <a:off x="504000" y="301320"/>
-            <a:ext cx="9071640" cy="1262160"/>
+            <a:ext cx="9071280" cy="1262160"/>
           </a:xfrm>
           <a:prstGeom prst="rect">
             <a:avLst/>
@@ -5793,7 +5793,7 @@
         <p:spPr>
           <a:xfrm>
             <a:off x="504000" y="4058640"/>
-            <a:ext cx="9072000" cy="2090880"/>
+            <a:ext cx="9071640" cy="2090880"/>
           </a:xfrm>
           <a:prstGeom prst="rect">
             <a:avLst/>
@@ -5843,7 +5843,7 @@
         <p:spPr>
           <a:xfrm>
             <a:off x="720" y="720"/>
-            <a:ext cx="10077480" cy="7557480"/>
+            <a:ext cx="10077120" cy="7557120"/>
           </a:xfrm>
           <a:prstGeom prst="rect">
             <a:avLst/>
@@ -6059,7 +6059,7 @@
         <p:spPr>
           <a:xfrm>
             <a:off x="720" y="720"/>
-            <a:ext cx="10077480" cy="7557480"/>
+            <a:ext cx="10077120" cy="7557120"/>
           </a:xfrm>
           <a:prstGeom prst="rect">
             <a:avLst/>
@@ -6275,7 +6275,7 @@
         <p:spPr>
           <a:xfrm>
             <a:off x="720" y="720"/>
-            <a:ext cx="10077480" cy="7557480"/>
+            <a:ext cx="10077120" cy="7557120"/>
           </a:xfrm>
           <a:prstGeom prst="rect">
             <a:avLst/>
@@ -6491,7 +6491,7 @@
         <p:spPr>
           <a:xfrm>
             <a:off x="720" y="720"/>
-            <a:ext cx="10077480" cy="7557480"/>
+            <a:ext cx="10077120" cy="7557120"/>
           </a:xfrm>
           <a:prstGeom prst="rect">
             <a:avLst/>
@@ -6707,7 +6707,7 @@
         <p:spPr>
           <a:xfrm>
             <a:off x="720" y="720"/>
-            <a:ext cx="10077480" cy="7557480"/>
+            <a:ext cx="10077120" cy="7557120"/>
           </a:xfrm>
           <a:prstGeom prst="rect">
             <a:avLst/>
@@ -6730,7 +6730,7 @@
         <p:spPr>
           <a:xfrm>
             <a:off x="504000" y="301320"/>
-            <a:ext cx="9071640" cy="1261800"/>
+            <a:ext cx="9071280" cy="1261800"/>
           </a:xfrm>
           <a:prstGeom prst="rect">
             <a:avLst/>
@@ -6762,7 +6762,7 @@
         <p:spPr>
           <a:xfrm>
             <a:off x="504000" y="1768680"/>
-            <a:ext cx="9072000" cy="4384080"/>
+            <a:ext cx="9071640" cy="4383720"/>
           </a:xfrm>
           <a:prstGeom prst="rect">
             <a:avLst/>
@@ -6777,7 +6777,7 @@
               <a:buChar char=""/>
             </a:pPr>
             <a:r>
-              <a:rPr lang="en-US" sz="3200">
+              <a:rPr lang="en-US">
                 <a:latin typeface="Arial"/>
               </a:rPr>
               <a:t>Click to edit the outline text format</a:t>
@@ -6791,7 +6791,7 @@
               <a:buChar char=""/>
             </a:pPr>
             <a:r>
-              <a:rPr lang="en-US" sz="2800">
+              <a:rPr lang="en-US">
                 <a:latin typeface="Arial"/>
               </a:rPr>
               <a:t>Second Outline Level</a:t>
@@ -6805,7 +6805,7 @@
               <a:buChar char=""/>
             </a:pPr>
             <a:r>
-              <a:rPr lang="en-US" sz="2400">
+              <a:rPr lang="en-US">
                 <a:latin typeface="Arial"/>
               </a:rPr>
               <a:t>Third Outline Level</a:t>
@@ -6819,7 +6819,7 @@
               <a:buChar char=""/>
             </a:pPr>
             <a:r>
-              <a:rPr lang="en-US" sz="2000">
+              <a:rPr lang="en-US">
                 <a:latin typeface="Arial"/>
               </a:rPr>
               <a:t>Fourth Outline Level</a:t>
@@ -6833,7 +6833,7 @@
               <a:buChar char=""/>
             </a:pPr>
             <a:r>
-              <a:rPr lang="en-US" sz="2000">
+              <a:rPr lang="en-US">
                 <a:latin typeface="Arial"/>
               </a:rPr>
               <a:t>Fifth Outline Level</a:t>
@@ -6847,7 +6847,7 @@
               <a:buChar char=""/>
             </a:pPr>
             <a:r>
-              <a:rPr lang="en-US" sz="2000">
+              <a:rPr lang="en-US">
                 <a:latin typeface="Arial"/>
               </a:rPr>
               <a:t>Sixth Outline Level</a:t>
@@ -6861,7 +6861,7 @@
               <a:buChar char=""/>
             </a:pPr>
             <a:r>
-              <a:rPr lang="en-US" sz="2000">
+              <a:rPr lang="en-US">
                 <a:latin typeface="Arial"/>
               </a:rPr>
               <a:t>Seventh Outline Level</a:t>
@@ -6916,7 +6916,7 @@
         <p:spPr>
           <a:xfrm>
             <a:off x="504000" y="576000"/>
-            <a:ext cx="7197840" cy="717840"/>
+            <a:ext cx="7197480" cy="717480"/>
           </a:xfrm>
           <a:prstGeom prst="rect">
             <a:avLst/>
@@ -6948,7 +6948,7 @@
         <p:spPr>
           <a:xfrm>
             <a:off x="504000" y="1800000"/>
-            <a:ext cx="9069840" cy="4382280"/>
+            <a:ext cx="9069480" cy="4381920"/>
           </a:xfrm>
           <a:prstGeom prst="rect">
             <a:avLst/>
@@ -6974,7 +6974,7 @@
         <p:spPr>
           <a:xfrm>
             <a:off x="1463040" y="548640"/>
-            <a:ext cx="7557480" cy="7557480"/>
+            <a:ext cx="7557120" cy="7557120"/>
           </a:xfrm>
           <a:prstGeom prst="rect">
             <a:avLst/>
@@ -7042,7 +7042,7 @@
         <p:spPr>
           <a:xfrm>
             <a:off x="504000" y="301320"/>
-            <a:ext cx="9070560" cy="1260360"/>
+            <a:ext cx="9070200" cy="1260000"/>
           </a:xfrm>
           <a:prstGeom prst="rect">
             <a:avLst/>
@@ -7074,7 +7074,7 @@
         <p:spPr>
           <a:xfrm>
             <a:off x="504000" y="1768680"/>
-            <a:ext cx="9070560" cy="5493960"/>
+            <a:ext cx="9070200" cy="5493600"/>
           </a:xfrm>
           <a:prstGeom prst="rect">
             <a:avLst/>
@@ -7230,7 +7230,7 @@
         <p:spPr>
           <a:xfrm>
             <a:off x="504000" y="576000"/>
-            <a:ext cx="7197840" cy="717840"/>
+            <a:ext cx="7197480" cy="717480"/>
           </a:xfrm>
           <a:prstGeom prst="rect">
             <a:avLst/>
@@ -7262,7 +7262,7 @@
         <p:spPr>
           <a:xfrm>
             <a:off x="504000" y="1800000"/>
-            <a:ext cx="9069840" cy="5330160"/>
+            <a:ext cx="9069480" cy="5329800"/>
           </a:xfrm>
           <a:prstGeom prst="rect">
             <a:avLst/>
@@ -7482,7 +7482,7 @@
         <p:spPr>
           <a:xfrm>
             <a:off x="504000" y="301320"/>
-            <a:ext cx="9070560" cy="1260360"/>
+            <a:ext cx="9070200" cy="1260000"/>
           </a:xfrm>
           <a:prstGeom prst="rect">
             <a:avLst/>
@@ -7514,7 +7514,7 @@
         <p:spPr>
           <a:xfrm>
             <a:off x="504000" y="1768680"/>
-            <a:ext cx="9070560" cy="4786920"/>
+            <a:ext cx="9070200" cy="4786560"/>
           </a:xfrm>
           <a:prstGeom prst="rect">
             <a:avLst/>
@@ -7637,7 +7637,7 @@
         <p:spPr>
           <a:xfrm>
             <a:off x="504000" y="301320"/>
-            <a:ext cx="9070920" cy="1260720"/>
+            <a:ext cx="9070560" cy="1260360"/>
           </a:xfrm>
           <a:prstGeom prst="rect">
             <a:avLst/>
@@ -7669,7 +7669,7 @@
         <p:spPr>
           <a:xfrm>
             <a:off x="504000" y="1768680"/>
-            <a:ext cx="9070920" cy="4899960"/>
+            <a:ext cx="9070560" cy="4899600"/>
           </a:xfrm>
           <a:prstGeom prst="rect">
             <a:avLst/>
@@ -7716,7 +7716,7 @@
               <a:rPr lang="en-US" sz="2400">
                 <a:latin typeface="Arial"/>
               </a:rPr>
-              <a:t>Пример можно посмотреть тут:</a:t>
+              <a:t>Пример можно посмотреть тут: http://localhost:8080/lessons/3/constants.php</a:t>
             </a:r>
             <a:endParaRPr/>
           </a:p>
@@ -7783,7 +7783,7 @@
         <p:spPr>
           <a:xfrm>
             <a:off x="504000" y="301320"/>
-            <a:ext cx="9070920" cy="1260720"/>
+            <a:ext cx="9070560" cy="1260360"/>
           </a:xfrm>
           <a:prstGeom prst="rect">
             <a:avLst/>
@@ -7815,7 +7815,7 @@
         <p:spPr>
           <a:xfrm>
             <a:off x="504000" y="1768680"/>
-            <a:ext cx="9070920" cy="4383000"/>
+            <a:ext cx="9070560" cy="4382640"/>
           </a:xfrm>
           <a:prstGeom prst="rect">
             <a:avLst/>
@@ -7835,7 +7835,7 @@
         <p:spPr>
           <a:xfrm>
             <a:off x="504000" y="301320"/>
-            <a:ext cx="9071640" cy="1261440"/>
+            <a:ext cx="9071280" cy="1261080"/>
           </a:xfrm>
           <a:prstGeom prst="rect">
             <a:avLst/>
@@ -7855,7 +7855,7 @@
         <p:spPr>
           <a:xfrm>
             <a:off x="504000" y="1768680"/>
-            <a:ext cx="9071640" cy="4383720"/>
+            <a:ext cx="9071280" cy="4383360"/>
           </a:xfrm>
           <a:prstGeom prst="rect">
             <a:avLst/>

</xml_diff>